<commit_message>
adding evaluations and MA backup
</commit_message>
<xml_diff>
--- a/Backup_MA/Ausarbeitung/graphs/medSystem_adap_calc.pptx
+++ b/Backup_MA/Ausarbeitung/graphs/medSystem_adap_calc.pptx
@@ -7856,8 +7856,8 @@
             <a:lstStyle/>
             <a:p>
               <a:r>
-                <a:rPr lang="en-GB" b="1" u="sng" dirty="0" err="1"/>
-                <a:t>AccountingService</a:t>
+                <a:rPr lang="en-GB" b="1" u="sng" dirty="0"/>
+                <a:t>AccountingService-2</a:t>
               </a:r>
               <a:endParaRPr lang="en-GB" b="1" u="sng" dirty="0"/>
             </a:p>

</xml_diff>